<commit_message>
Online, vor dem Termin am 29.05.2022
</commit_message>
<xml_diff>
--- a/my-materials/ppt/archiv/ML02 Data as Vectors.pptx
+++ b/my-materials/ppt/archiv/ML02 Data as Vectors.pptx
@@ -152,14 +152,6 @@
 </p:presentation>
 </file>
 
-<file path=ppt/revisionInfo.xml><?xml version="1.0" encoding="utf-8"?>
-<p1510:revInfo xmlns:a="http://schemas.openxmlformats.org/drawingml/2006/main" xmlns:r="http://schemas.openxmlformats.org/officeDocument/2006/relationships" xmlns:p1510="http://schemas.microsoft.com/office/powerpoint/2015/10/main">
-  <p1510:revLst>
-    <p1510:client id="{BC3DC1E6-F828-4199-86F8-8287BDF8EB3E}" v="6" dt="2019-06-26T05:46:11.823"/>
-  </p1510:revLst>
-</p1510:revInfo>
-</file>
-
 <file path=ppt/changesInfos/changesInfo1.xml><?xml version="1.0" encoding="utf-8"?>
 <pc:chgInfo xmlns:a="http://schemas.openxmlformats.org/drawingml/2006/main" xmlns:r="http://schemas.openxmlformats.org/officeDocument/2006/relationships" xmlns:ac="http://schemas.microsoft.com/office/drawing/2013/main/command" xmlns:pc="http://schemas.microsoft.com/office/powerpoint/2013/main/command">
   <pc:docChgLst>
@@ -235,6 +227,9 @@
     </pc:docChg>
   </pc:docChgLst>
   <pc:docChgLst>
+    <pc:chgData name="dgreipl" userId="d97562fd-b189-437e-b91d-de7b81e9769e" providerId="ADAL" clId="{961C556F-589F-496A-B84E-11B8F73F23B7}"/>
+  </pc:docChgLst>
+  <pc:docChgLst>
     <pc:chgData name=" " userId="d97562fd-b189-437e-b91d-de7b81e9769e" providerId="ADAL" clId="{58814B3C-456C-4BEF-9D6C-048050C82574}"/>
     <pc:docChg chg="delSld modSld">
       <pc:chgData name=" " userId="d97562fd-b189-437e-b91d-de7b81e9769e" providerId="ADAL" clId="{58814B3C-456C-4BEF-9D6C-048050C82574}" dt="2019-06-16T11:55:58.772" v="25" actId="2711"/>
@@ -257,9 +252,6 @@
         </pc:spChg>
       </pc:sldChg>
     </pc:docChg>
-  </pc:docChgLst>
-  <pc:docChgLst>
-    <pc:chgData name="dgreipl" userId="d97562fd-b189-437e-b91d-de7b81e9769e" providerId="ADAL" clId="{961C556F-589F-496A-B84E-11B8F73F23B7}"/>
   </pc:docChgLst>
   <pc:docChgLst>
     <pc:chgData name="dgreipl" userId="d97562fd-b189-437e-b91d-de7b81e9769e" providerId="ADAL" clId="{3A2B8B91-C5A2-4C49-B359-14B037908979}"/>
@@ -4167,6 +4159,15 @@
     </pc:docChg>
   </pc:docChgLst>
   <pc:docChgLst>
+    <pc:chgData name=" " userId="d97562fd-b189-437e-b91d-de7b81e9769e" providerId="ADAL" clId="{3BAD6421-2A50-4CEA-9EEC-D5F0A76FFEC1}"/>
+    <pc:docChg chg="custSel modSld">
+      <pc:chgData name=" " userId="d97562fd-b189-437e-b91d-de7b81e9769e" providerId="ADAL" clId="{3BAD6421-2A50-4CEA-9EEC-D5F0A76FFEC1}" dt="2019-06-03T13:32:21.926" v="14" actId="20577"/>
+      <pc:docMkLst>
+        <pc:docMk/>
+      </pc:docMkLst>
+    </pc:docChg>
+  </pc:docChgLst>
+  <pc:docChgLst>
     <pc:chgData name=" " userId="d97562fd-b189-437e-b91d-de7b81e9769e" providerId="ADAL" clId="{BC3DC1E6-F828-4199-86F8-8287BDF8EB3E}"/>
     <pc:docChg chg="custSel delSld modSld">
       <pc:chgData name=" " userId="d97562fd-b189-437e-b91d-de7b81e9769e" providerId="ADAL" clId="{BC3DC1E6-F828-4199-86F8-8287BDF8EB3E}" dt="2019-06-28T11:48:38.529" v="148" actId="20577"/>
@@ -4211,15 +4212,6 @@
           </ac:spMkLst>
         </pc:spChg>
       </pc:sldChg>
-    </pc:docChg>
-  </pc:docChgLst>
-  <pc:docChgLst>
-    <pc:chgData name=" " userId="d97562fd-b189-437e-b91d-de7b81e9769e" providerId="ADAL" clId="{3BAD6421-2A50-4CEA-9EEC-D5F0A76FFEC1}"/>
-    <pc:docChg chg="custSel modSld">
-      <pc:chgData name=" " userId="d97562fd-b189-437e-b91d-de7b81e9769e" providerId="ADAL" clId="{3BAD6421-2A50-4CEA-9EEC-D5F0A76FFEC1}" dt="2019-06-03T13:32:21.926" v="14" actId="20577"/>
-      <pc:docMkLst>
-        <pc:docMk/>
-      </pc:docMkLst>
     </pc:docChg>
   </pc:docChgLst>
   <pc:docChgLst>
@@ -4374,7 +4366,7 @@
           <a:p>
             <a:fld id="{EE0D4A65-4BAF-4E99-B6EF-5547CCE4A97F}" type="datetimeFigureOut">
               <a:rPr lang="de-DE" smtClean="0"/>
-              <a:t>28.06.2019</a:t>
+              <a:t>07.10.2019</a:t>
             </a:fld>
             <a:endParaRPr lang="de-DE"/>
           </a:p>
@@ -7387,7 +7379,7 @@
           <a:p>
             <a:fld id="{FBDD1A8F-935D-450A-B89A-1A95DCA0E4F3}" type="datetimeFigureOut">
               <a:rPr lang="de-DE" smtClean="0"/>
-              <a:t>28.06.2019</a:t>
+              <a:t>07.10.2019</a:t>
             </a:fld>
             <a:endParaRPr lang="de-DE"/>
           </a:p>

</xml_diff>